<commit_message>
Set the guess number to 6
</commit_message>
<xml_diff>
--- a/Hangman - Network Application.pptx
+++ b/Hangman - Network Application.pptx
@@ -4493,6 +4493,14 @@
             </a:r>
           </a:p>
           <a:p>
+            <a:r>
+              <a:rPr lang="en-GB" noProof="0" dirty="0"/>
+              <a:t>The number of </a:t>
+            </a:r>
+            <a:r>
+              <a:rPr lang="en-GB" noProof="0"/>
+              <a:t>guess is set to 6.</a:t>
+            </a:r>
             <a:endParaRPr lang="en-GB" noProof="0" dirty="0"/>
           </a:p>
         </p:txBody>

</xml_diff>

<commit_message>
Add script and change try to 7
</commit_message>
<xml_diff>
--- a/Hangman - Network Application.pptx
+++ b/Hangman - Network Application.pptx
@@ -4417,9 +4417,10 @@
           <a:lstStyle/>
           <a:p>
             <a:r>
-              <a:rPr lang="en-GB" noProof="0" dirty="0"/>
-              <a:t>Initial Idea</a:t>
-            </a:r>
+              <a:rPr lang="en-GB" noProof="0"/>
+              <a:t>Introduction</a:t>
+            </a:r>
+            <a:endParaRPr lang="en-GB" noProof="0" dirty="0"/>
           </a:p>
         </p:txBody>
       </p:sp>
@@ -4495,13 +4496,8 @@
           <a:p>
             <a:r>
               <a:rPr lang="en-GB" noProof="0" dirty="0"/>
-              <a:t>The number of </a:t>
-            </a:r>
-            <a:r>
-              <a:rPr lang="en-GB" noProof="0"/>
-              <a:t>guess is set to 6.</a:t>
-            </a:r>
-            <a:endParaRPr lang="en-GB" noProof="0" dirty="0"/>
+              <a:t>The number of guess is set to 7.</a:t>
+            </a:r>
           </a:p>
         </p:txBody>
       </p:sp>
@@ -4720,7 +4716,15 @@
             </a:r>
             <a:r>
               <a:rPr lang="en-US" dirty="0"/>
-              <a:t> word&gt; (Server -&gt; Client): the guess was incorrect.  Attempts left was decreased (e.g., 6 "_ _ _ _ _")</a:t>
+              <a:t> word&gt; (Server -&gt; Client): the guess was incorrect.  Attempts left was decreased (e.g</a:t>
+            </a:r>
+            <a:r>
+              <a:rPr lang="en-US"/>
+              <a:t>., 6 </a:t>
+            </a:r>
+            <a:r>
+              <a:rPr lang="en-US" dirty="0"/>
+              <a:t>"_ _ _ _ _")</a:t>
             </a:r>
           </a:p>
           <a:p>

</xml_diff>